<commit_message>
Adding Github Repo link to PPt
</commit_message>
<xml_diff>
--- a/DataFlow-AI-Unified-Conversational-Data-Analytics-Platform.pptx
+++ b/DataFlow-AI-Unified-Conversational-Data-Analytics-Platform.pptx
@@ -1805,11 +1805,10 @@
             </a:r>
           </a:p>
           <a:p>
-            <a:pPr marL="0" indent="0" algn="l">
+            <a:pPr>
               <a:lnSpc>
                 <a:spcPts val="2250"/>
               </a:lnSpc>
-              <a:buNone/>
             </a:pPr>
             <a:r>
               <a:rPr lang="en-US" b="1" dirty="0">
@@ -1818,25 +1817,34 @@
                 </a:solidFill>
                 <a:latin typeface="Montserrat" pitchFamily="34" charset="0"/>
               </a:rPr>
-              <a:t>Abhishek Karn, Amitabh Gupta, </a:t>
-            </a:r>
-            <a:r>
-              <a:rPr lang="en-US" b="1">
-                <a:solidFill>
-                  <a:srgbClr val="384653"/>
-                </a:solidFill>
-                <a:latin typeface="Montserrat" pitchFamily="34" charset="0"/>
-              </a:rPr>
-              <a:t>Shubhangi Mishra and </a:t>
-            </a:r>
-            <a:r>
+              <a:t>Abhishek Karn, Amitabh Gupta, Shubhangi Mishra and Vibhanshu Ray.</a:t>
+            </a:r>
+            <a:br>
               <a:rPr lang="en-US" b="1" dirty="0">
                 <a:solidFill>
                   <a:srgbClr val="384653"/>
                 </a:solidFill>
                 <a:latin typeface="Montserrat" pitchFamily="34" charset="0"/>
               </a:rPr>
-              <a:t>Vibhanshu Ray</a:t>
+            </a:br>
+            <a:r>
+              <a:rPr lang="en-US" b="1" dirty="0">
+                <a:solidFill>
+                  <a:srgbClr val="384653"/>
+                </a:solidFill>
+                <a:latin typeface="Montserrat" pitchFamily="34" charset="0"/>
+              </a:rPr>
+              <a:t>Link to GitHub Repo: </a:t>
+            </a:r>
+            <a:r>
+              <a:rPr lang="en-US" b="1" dirty="0">
+                <a:solidFill>
+                  <a:srgbClr val="384653"/>
+                </a:solidFill>
+                <a:latin typeface="Montserrat" pitchFamily="34" charset="0"/>
+                <a:hlinkClick r:id="rId2"/>
+              </a:rPr>
+              <a:t>https://github.com/SHMISHRA666/DataFlow-AI-Unified-Conversational-Data-Analytics-Platform</a:t>
             </a:r>
             <a:endParaRPr lang="en-US" b="1" dirty="0"/>
           </a:p>
@@ -1940,7 +1948,7 @@
             <p:nvPr/>
           </p:nvPicPr>
           <p:blipFill>
-            <a:blip r:embed="rId2"/>
+            <a:blip r:embed="rId3"/>
             <a:stretch>
               <a:fillRect/>
             </a:stretch>
@@ -2075,7 +2083,7 @@
             <p:nvPr/>
           </p:nvPicPr>
           <p:blipFill>
-            <a:blip r:embed="rId3"/>
+            <a:blip r:embed="rId4"/>
             <a:stretch>
               <a:fillRect/>
             </a:stretch>
@@ -2210,7 +2218,7 @@
             <p:nvPr/>
           </p:nvPicPr>
           <p:blipFill>
-            <a:blip r:embed="rId4"/>
+            <a:blip r:embed="rId5"/>
             <a:stretch>
               <a:fillRect/>
             </a:stretch>
@@ -2345,7 +2353,7 @@
             <p:nvPr/>
           </p:nvPicPr>
           <p:blipFill>
-            <a:blip r:embed="rId5"/>
+            <a:blip r:embed="rId6"/>
             <a:stretch>
               <a:fillRect/>
             </a:stretch>

</xml_diff>